<commit_message>
update mobilenet file and delete pdf.
</commit_message>
<xml_diff>
--- a/Inference/GraphOpt/01.transfer.pptx
+++ b/Inference/GraphOpt/01.transfer.pptx
@@ -10,26 +10,29 @@
     <p:sldMasterId id="2147483881" r:id="rId6"/>
   </p:sldMasterIdLst>
   <p:notesMasterIdLst>
-    <p:notesMasterId r:id="rId16"/>
+    <p:notesMasterId r:id="rId19"/>
   </p:notesMasterIdLst>
   <p:handoutMasterIdLst>
-    <p:handoutMasterId r:id="rId17"/>
+    <p:handoutMasterId r:id="rId20"/>
   </p:handoutMasterIdLst>
   <p:sldIdLst>
     <p:sldId id="1779" r:id="rId7"/>
     <p:sldId id="1792" r:id="rId8"/>
     <p:sldId id="1811" r:id="rId9"/>
     <p:sldId id="1812" r:id="rId10"/>
-    <p:sldId id="1813" r:id="rId11"/>
-    <p:sldId id="1809" r:id="rId12"/>
-    <p:sldId id="1795" r:id="rId13"/>
-    <p:sldId id="1718" r:id="rId14"/>
-    <p:sldId id="680" r:id="rId15"/>
+    <p:sldId id="1795" r:id="rId11"/>
+    <p:sldId id="1813" r:id="rId12"/>
+    <p:sldId id="1814" r:id="rId13"/>
+    <p:sldId id="1815" r:id="rId14"/>
+    <p:sldId id="1816" r:id="rId15"/>
+    <p:sldId id="1809" r:id="rId16"/>
+    <p:sldId id="1718" r:id="rId17"/>
+    <p:sldId id="680" r:id="rId18"/>
   </p:sldIdLst>
   <p:sldSz cx="12196763" cy="6858000"/>
   <p:notesSz cx="6805613" cy="9939338"/>
   <p:custDataLst>
-    <p:tags r:id="rId18"/>
+    <p:tags r:id="rId21"/>
   </p:custDataLst>
   <p:defaultTextStyle>
     <a:defPPr>
@@ -951,7 +954,7 @@
           <a:p>
             <a:fld id="{72E0C910-0166-48E0-B8EF-5071277A02A8}" type="datetime8">
               <a:rPr lang="en-US" smtClean="0"/>
-              <a:t>1/14/23 10:54 AM</a:t>
+              <a:t>1/14/23 9:56 PM</a:t>
             </a:fld>
             <a:endParaRPr lang="en-US" dirty="0"/>
           </a:p>
@@ -975,7 +978,7 @@
             <a:fld id="{B4008EB6-D09E-4580-8CD6-DDB14511944F}" type="slidenum">
               <a:rPr lang="en-US" smtClean="0"/>
               <a:pPr/>
-              <a:t>8</a:t>
+              <a:t>11</a:t>
             </a:fld>
             <a:endParaRPr lang="en-US" dirty="0"/>
           </a:p>
@@ -1044,7 +1047,7 @@
                 </a:solidFill>
               </a:rPr>
               <a:pPr/>
-              <a:t>9</a:t>
+              <a:t>12</a:t>
             </a:fld>
             <a:endParaRPr lang="en-US" altLang="zh-CN">
               <a:solidFill>
@@ -1091,7 +1094,7 @@
                 <a:ea typeface="MS PGothic" pitchFamily="34" charset="-128"/>
               </a:rPr>
               <a:pPr algn="r" defTabSz="931863" eaLnBrk="0" hangingPunct="0"/>
-              <a:t>9</a:t>
+              <a:t>12</a:t>
             </a:fld>
             <a:endParaRPr lang="en-US" altLang="zh-CN" sz="1200">
               <a:solidFill>
@@ -38642,6 +38645,236 @@
 </p:sld>
 </file>
 
+<file path=ppt/slides/slide10.xml><?xml version="1.0" encoding="utf-8"?>
+<p:sld xmlns:a="http://schemas.openxmlformats.org/drawingml/2006/main" xmlns:r="http://schemas.openxmlformats.org/officeDocument/2006/relationships" xmlns:p="http://schemas.openxmlformats.org/presentationml/2006/main">
+  <p:cSld>
+    <p:spTree>
+      <p:nvGrpSpPr>
+        <p:cNvPr id="1" name=""/>
+        <p:cNvGrpSpPr/>
+        <p:nvPr/>
+      </p:nvGrpSpPr>
+      <p:grpSpPr>
+        <a:xfrm>
+          <a:off x="0" y="0"/>
+          <a:ext cx="0" cy="0"/>
+          <a:chOff x="0" y="0"/>
+          <a:chExt cx="0" cy="0"/>
+        </a:xfrm>
+      </p:grpSpPr>
+      <p:sp>
+        <p:nvSpPr>
+          <p:cNvPr id="2" name="标题 1">
+            <a:extLst>
+              <a:ext uri="{FF2B5EF4-FFF2-40B4-BE49-F238E27FC236}">
+                <a16:creationId xmlns:a16="http://schemas.microsoft.com/office/drawing/2014/main" id="{8A1B07AB-8AC0-2C42-9CD8-3B19C2CD10B1}"/>
+              </a:ext>
+            </a:extLst>
+          </p:cNvPr>
+          <p:cNvSpPr>
+            <a:spLocks noGrp="1"/>
+          </p:cNvSpPr>
+          <p:nvPr>
+            <p:ph type="title"/>
+          </p:nvPr>
+        </p:nvSpPr>
+        <p:spPr/>
+        <p:txBody>
+          <a:bodyPr/>
+          <a:lstStyle/>
+          <a:p>
+            <a:r>
+              <a:rPr lang="zh-CN" altLang="en-US" dirty="0"/>
+              <a:t>开发推理程序</a:t>
+            </a:r>
+          </a:p>
+        </p:txBody>
+      </p:sp>
+      <p:pic>
+        <p:nvPicPr>
+          <p:cNvPr id="3" name="图片 2">
+            <a:extLst>
+              <a:ext uri="{FF2B5EF4-FFF2-40B4-BE49-F238E27FC236}">
+                <a16:creationId xmlns:a16="http://schemas.microsoft.com/office/drawing/2014/main" id="{54791655-4558-A948-9401-7E2ABB0D8881}"/>
+              </a:ext>
+            </a:extLst>
+          </p:cNvPr>
+          <p:cNvPicPr>
+            <a:picLocks noChangeAspect="1"/>
+          </p:cNvPicPr>
+          <p:nvPr/>
+        </p:nvPicPr>
+        <p:blipFill>
+          <a:blip r:embed="rId2"/>
+          <a:stretch>
+            <a:fillRect/>
+          </a:stretch>
+        </p:blipFill>
+        <p:spPr>
+          <a:xfrm>
+            <a:off x="1561877" y="1484784"/>
+            <a:ext cx="8496944" cy="4388532"/>
+          </a:xfrm>
+          <a:prstGeom prst="rect">
+            <a:avLst/>
+          </a:prstGeom>
+        </p:spPr>
+      </p:pic>
+    </p:spTree>
+    <p:extLst>
+      <p:ext uri="{BB962C8B-B14F-4D97-AF65-F5344CB8AC3E}">
+        <p14:creationId xmlns:p14="http://schemas.microsoft.com/office/powerpoint/2010/main" val="1487473700"/>
+      </p:ext>
+    </p:extLst>
+  </p:cSld>
+  <p:clrMapOvr>
+    <a:masterClrMapping/>
+  </p:clrMapOvr>
+  <mc:AlternateContent xmlns:mc="http://schemas.openxmlformats.org/markup-compatibility/2006" xmlns:p159="http://schemas.microsoft.com/office/powerpoint/2015/09/main">
+    <mc:Choice Requires="p159">
+      <p:transition spd="slow" advClick="0">
+        <p159:morph option="byObject"/>
+      </p:transition>
+    </mc:Choice>
+    <mc:Fallback xmlns="">
+      <p:transition spd="slow" advClick="0">
+        <p:fade/>
+      </p:transition>
+    </mc:Fallback>
+  </mc:AlternateContent>
+</p:sld>
+</file>
+
+<file path=ppt/slides/slide11.xml><?xml version="1.0" encoding="utf-8"?>
+<p:sld xmlns:a="http://schemas.openxmlformats.org/drawingml/2006/main" xmlns:r="http://schemas.openxmlformats.org/officeDocument/2006/relationships" xmlns:p="http://schemas.openxmlformats.org/presentationml/2006/main">
+  <p:cSld>
+    <p:spTree>
+      <p:nvGrpSpPr>
+        <p:cNvPr id="1" name=""/>
+        <p:cNvGrpSpPr/>
+        <p:nvPr/>
+      </p:nvGrpSpPr>
+      <p:grpSpPr>
+        <a:xfrm>
+          <a:off x="0" y="0"/>
+          <a:ext cx="0" cy="0"/>
+          <a:chOff x="0" y="0"/>
+          <a:chExt cx="0" cy="0"/>
+        </a:xfrm>
+      </p:grpSpPr>
+      <p:sp>
+        <p:nvSpPr>
+          <p:cNvPr id="17" name="Title 16"/>
+          <p:cNvSpPr>
+            <a:spLocks noGrp="1"/>
+          </p:cNvSpPr>
+          <p:nvPr>
+            <p:ph type="title"/>
+          </p:nvPr>
+        </p:nvSpPr>
+        <p:spPr/>
+        <p:txBody>
+          <a:bodyPr/>
+          <a:lstStyle/>
+          <a:p>
+            <a:r>
+              <a:rPr lang="zh-CN" altLang="en-US" dirty="0"/>
+              <a:t>参考文献</a:t>
+            </a:r>
+            <a:endParaRPr lang="en-US" dirty="0"/>
+          </a:p>
+        </p:txBody>
+      </p:sp>
+      <p:sp>
+        <p:nvSpPr>
+          <p:cNvPr id="6" name="Text Placeholder 5"/>
+          <p:cNvSpPr>
+            <a:spLocks noGrp="1"/>
+          </p:cNvSpPr>
+          <p:nvPr>
+            <p:ph sz="half" idx="1"/>
+          </p:nvPr>
+        </p:nvSpPr>
+        <p:spPr/>
+        <p:txBody>
+          <a:bodyPr/>
+          <a:lstStyle/>
+          <a:p>
+            <a:pPr marL="404813" indent="-395288">
+              <a:buFont typeface="+mj-lt"/>
+              <a:buAutoNum type="arabicPeriod"/>
+            </a:pPr>
+            <a:endParaRPr lang="en-US" sz="1200" dirty="0"/>
+          </a:p>
+        </p:txBody>
+      </p:sp>
+    </p:spTree>
+    <p:extLst>
+      <p:ext uri="{BB962C8B-B14F-4D97-AF65-F5344CB8AC3E}">
+        <p14:creationId xmlns:p14="http://schemas.microsoft.com/office/powerpoint/2010/main" val="262018297"/>
+      </p:ext>
+    </p:extLst>
+  </p:cSld>
+  <p:clrMapOvr>
+    <a:masterClrMapping/>
+  </p:clrMapOvr>
+  <mc:AlternateContent xmlns:mc="http://schemas.openxmlformats.org/markup-compatibility/2006" xmlns:p14="http://schemas.microsoft.com/office/powerpoint/2010/main">
+    <mc:Choice Requires="p14">
+      <p:transition spd="med" p14:dur="700">
+        <p:fade/>
+      </p:transition>
+    </mc:Choice>
+    <mc:Fallback xmlns="">
+      <p:transition spd="med">
+        <p:fade/>
+      </p:transition>
+    </mc:Fallback>
+  </mc:AlternateContent>
+</p:sld>
+</file>
+
+<file path=ppt/slides/slide12.xml><?xml version="1.0" encoding="utf-8"?>
+<p:sld xmlns:a="http://schemas.openxmlformats.org/drawingml/2006/main" xmlns:r="http://schemas.openxmlformats.org/officeDocument/2006/relationships" xmlns:p="http://schemas.openxmlformats.org/presentationml/2006/main">
+  <p:cSld>
+    <p:spTree>
+      <p:nvGrpSpPr>
+        <p:cNvPr id="1" name=""/>
+        <p:cNvGrpSpPr/>
+        <p:nvPr/>
+      </p:nvGrpSpPr>
+      <p:grpSpPr>
+        <a:xfrm>
+          <a:off x="0" y="0"/>
+          <a:ext cx="0" cy="0"/>
+          <a:chOff x="0" y="0"/>
+          <a:chExt cx="0" cy="0"/>
+        </a:xfrm>
+      </p:grpSpPr>
+    </p:spTree>
+    <p:extLst>
+      <p:ext uri="{BB962C8B-B14F-4D97-AF65-F5344CB8AC3E}">
+        <p14:creationId xmlns:p14="http://schemas.microsoft.com/office/powerpoint/2010/main" val="2327015185"/>
+      </p:ext>
+    </p:extLst>
+  </p:cSld>
+  <p:clrMapOvr>
+    <a:masterClrMapping/>
+  </p:clrMapOvr>
+  <mc:AlternateContent xmlns:mc="http://schemas.openxmlformats.org/markup-compatibility/2006" xmlns:p159="http://schemas.microsoft.com/office/powerpoint/2015/09/main">
+    <mc:Choice Requires="p159">
+      <p:transition spd="slow" advClick="0">
+        <p159:morph option="byObject"/>
+      </p:transition>
+    </mc:Choice>
+    <mc:Fallback xmlns="">
+      <p:transition spd="slow" advClick="0">
+        <p:fade/>
+      </p:transition>
+    </mc:Fallback>
+  </mc:AlternateContent>
+</p:sld>
+</file>
+
 <file path=ppt/slides/slide2.xml><?xml version="1.0" encoding="utf-8"?>
 <p:sld xmlns:a="http://schemas.openxmlformats.org/drawingml/2006/main" xmlns:r="http://schemas.openxmlformats.org/officeDocument/2006/relationships" xmlns:p="http://schemas.openxmlformats.org/presentationml/2006/main">
   <p:cSld>
@@ -39559,16 +39792,7 @@
               </a:rPr>
               <a:t>Runtime</a:t>
             </a:r>
-          </a:p>
-          <a:p>
-            <a:pPr lvl="1">
-              <a:lnSpc>
-                <a:spcPct val="130000"/>
-              </a:lnSpc>
-              <a:buFont typeface="Arial" panose="020B0604020202020204" pitchFamily="34" charset="0"/>
-              <a:buChar char="•"/>
-            </a:pPr>
-            <a:endParaRPr lang="en-US" altLang="zh-CN" sz="2000">
+            <a:endParaRPr lang="en-US" altLang="zh-CN" sz="2000" dirty="0">
               <a:solidFill>
                 <a:srgbClr val="374154"/>
               </a:solidFill>
@@ -40822,251 +41046,209 @@
       </p:grpSpPr>
       <p:sp>
         <p:nvSpPr>
-          <p:cNvPr id="5" name="标题 4">
+          <p:cNvPr id="11" name="标题 1">
             <a:extLst>
               <a:ext uri="{FF2B5EF4-FFF2-40B4-BE49-F238E27FC236}">
-                <a16:creationId xmlns:a16="http://schemas.microsoft.com/office/drawing/2014/main" id="{1EE43E42-0F5F-8144-A3DF-E8EDD0648BA6}"/>
+                <a16:creationId xmlns:a16="http://schemas.microsoft.com/office/drawing/2014/main" id="{DAD4934B-A6D5-F641-A028-A1441C365755}"/>
               </a:ext>
             </a:extLst>
           </p:cNvPr>
           <p:cNvSpPr>
             <a:spLocks noGrp="1"/>
           </p:cNvSpPr>
-          <p:nvPr>
-            <p:ph type="title"/>
-          </p:nvPr>
+          <p:nvPr/>
         </p:nvSpPr>
-        <p:spPr/>
+        <p:spPr>
+          <a:xfrm>
+            <a:off x="616645" y="980728"/>
+            <a:ext cx="10963473" cy="4824536"/>
+          </a:xfrm>
+          <a:prstGeom prst="rect">
+            <a:avLst/>
+          </a:prstGeom>
+          <a:noFill/>
+        </p:spPr>
         <p:txBody>
-          <a:bodyPr/>
-          <a:lstStyle/>
+          <a:bodyPr anchor="ctr"/>
+          <a:lstStyle>
+            <a:lvl1pPr algn="l" rtl="0" eaLnBrk="1" fontAlgn="base" hangingPunct="1">
+              <a:spcBef>
+                <a:spcPct val="0"/>
+              </a:spcBef>
+              <a:spcAft>
+                <a:spcPct val="0"/>
+              </a:spcAft>
+              <a:defRPr kumimoji="0" lang="zh-CN" altLang="en-US" sz="3199" b="1" i="0" u="none" strike="noStrike" kern="0" cap="none" spc="0" normalizeH="0" baseline="0" dirty="0">
+                <a:ln>
+                  <a:noFill/>
+                </a:ln>
+                <a:solidFill>
+                  <a:srgbClr val="384056"/>
+                </a:solidFill>
+                <a:effectLst/>
+                <a:uLnTx/>
+                <a:uFillTx/>
+                <a:latin typeface="微软雅黑" pitchFamily="34" charset="-122"/>
+                <a:ea typeface="微软雅黑" pitchFamily="34" charset="-122"/>
+                <a:cs typeface="Arial" pitchFamily="34" charset="0"/>
+              </a:defRPr>
+            </a:lvl1pPr>
+            <a:lvl2pPr algn="l" rtl="0" eaLnBrk="1" fontAlgn="base" hangingPunct="1">
+              <a:spcBef>
+                <a:spcPct val="0"/>
+              </a:spcBef>
+              <a:spcAft>
+                <a:spcPct val="0"/>
+              </a:spcAft>
+              <a:defRPr sz="3199" b="1">
+                <a:solidFill>
+                  <a:srgbClr val="990000"/>
+                </a:solidFill>
+                <a:latin typeface="FrutigerNext LT Medium" pitchFamily="34" charset="0"/>
+                <a:ea typeface="华文细黑" pitchFamily="2" charset="-122"/>
+                <a:cs typeface="SimSun" pitchFamily="2" charset="-122"/>
+              </a:defRPr>
+            </a:lvl2pPr>
+            <a:lvl3pPr algn="l" rtl="0" eaLnBrk="1" fontAlgn="base" hangingPunct="1">
+              <a:spcBef>
+                <a:spcPct val="0"/>
+              </a:spcBef>
+              <a:spcAft>
+                <a:spcPct val="0"/>
+              </a:spcAft>
+              <a:defRPr sz="3199" b="1">
+                <a:solidFill>
+                  <a:srgbClr val="990000"/>
+                </a:solidFill>
+                <a:latin typeface="FrutigerNext LT Medium" pitchFamily="34" charset="0"/>
+                <a:ea typeface="华文细黑" pitchFamily="2" charset="-122"/>
+                <a:cs typeface="SimSun" pitchFamily="2" charset="-122"/>
+              </a:defRPr>
+            </a:lvl3pPr>
+            <a:lvl4pPr algn="l" rtl="0" eaLnBrk="1" fontAlgn="base" hangingPunct="1">
+              <a:spcBef>
+                <a:spcPct val="0"/>
+              </a:spcBef>
+              <a:spcAft>
+                <a:spcPct val="0"/>
+              </a:spcAft>
+              <a:defRPr sz="3199" b="1">
+                <a:solidFill>
+                  <a:srgbClr val="990000"/>
+                </a:solidFill>
+                <a:latin typeface="FrutigerNext LT Medium" pitchFamily="34" charset="0"/>
+                <a:ea typeface="华文细黑" pitchFamily="2" charset="-122"/>
+                <a:cs typeface="SimSun" pitchFamily="2" charset="-122"/>
+              </a:defRPr>
+            </a:lvl4pPr>
+            <a:lvl5pPr algn="l" rtl="0" eaLnBrk="1" fontAlgn="base" hangingPunct="1">
+              <a:spcBef>
+                <a:spcPct val="0"/>
+              </a:spcBef>
+              <a:spcAft>
+                <a:spcPct val="0"/>
+              </a:spcAft>
+              <a:defRPr sz="3199" b="1">
+                <a:solidFill>
+                  <a:srgbClr val="990000"/>
+                </a:solidFill>
+                <a:latin typeface="FrutigerNext LT Medium" pitchFamily="34" charset="0"/>
+                <a:ea typeface="华文细黑" pitchFamily="2" charset="-122"/>
+                <a:cs typeface="SimSun" pitchFamily="2" charset="-122"/>
+              </a:defRPr>
+            </a:lvl5pPr>
+            <a:lvl6pPr marL="456854" algn="l" rtl="0" eaLnBrk="1" fontAlgn="base" hangingPunct="1">
+              <a:spcBef>
+                <a:spcPct val="0"/>
+              </a:spcBef>
+              <a:spcAft>
+                <a:spcPct val="0"/>
+              </a:spcAft>
+              <a:defRPr sz="3199" b="1">
+                <a:solidFill>
+                  <a:srgbClr val="990000"/>
+                </a:solidFill>
+                <a:latin typeface="FrutigerNext LT Medium" pitchFamily="34" charset="0"/>
+                <a:ea typeface="华文细黑" pitchFamily="2" charset="-122"/>
+                <a:cs typeface="SimSun" pitchFamily="2" charset="-122"/>
+              </a:defRPr>
+            </a:lvl6pPr>
+            <a:lvl7pPr marL="913707" algn="l" rtl="0" eaLnBrk="1" fontAlgn="base" hangingPunct="1">
+              <a:spcBef>
+                <a:spcPct val="0"/>
+              </a:spcBef>
+              <a:spcAft>
+                <a:spcPct val="0"/>
+              </a:spcAft>
+              <a:defRPr sz="3199" b="1">
+                <a:solidFill>
+                  <a:srgbClr val="990000"/>
+                </a:solidFill>
+                <a:latin typeface="FrutigerNext LT Medium" pitchFamily="34" charset="0"/>
+                <a:ea typeface="华文细黑" pitchFamily="2" charset="-122"/>
+                <a:cs typeface="SimSun" pitchFamily="2" charset="-122"/>
+              </a:defRPr>
+            </a:lvl7pPr>
+            <a:lvl8pPr marL="1370561" algn="l" rtl="0" eaLnBrk="1" fontAlgn="base" hangingPunct="1">
+              <a:spcBef>
+                <a:spcPct val="0"/>
+              </a:spcBef>
+              <a:spcAft>
+                <a:spcPct val="0"/>
+              </a:spcAft>
+              <a:defRPr sz="3199" b="1">
+                <a:solidFill>
+                  <a:srgbClr val="990000"/>
+                </a:solidFill>
+                <a:latin typeface="FrutigerNext LT Medium" pitchFamily="34" charset="0"/>
+                <a:ea typeface="华文细黑" pitchFamily="2" charset="-122"/>
+                <a:cs typeface="SimSun" pitchFamily="2" charset="-122"/>
+              </a:defRPr>
+            </a:lvl8pPr>
+            <a:lvl9pPr marL="1827414" algn="l" rtl="0" eaLnBrk="1" fontAlgn="base" hangingPunct="1">
+              <a:spcBef>
+                <a:spcPct val="0"/>
+              </a:spcBef>
+              <a:spcAft>
+                <a:spcPct val="0"/>
+              </a:spcAft>
+              <a:defRPr sz="3199" b="1">
+                <a:solidFill>
+                  <a:srgbClr val="990000"/>
+                </a:solidFill>
+                <a:latin typeface="FrutigerNext LT Medium" pitchFamily="34" charset="0"/>
+                <a:ea typeface="华文细黑" pitchFamily="2" charset="-122"/>
+                <a:cs typeface="SimSun" pitchFamily="2" charset="-122"/>
+              </a:defRPr>
+            </a:lvl9pPr>
+          </a:lstStyle>
           <a:p>
-            <a:endParaRPr lang="zh-CN" altLang="en-US"/>
-          </a:p>
-        </p:txBody>
-      </p:sp>
-      <p:sp>
-        <p:nvSpPr>
-          <p:cNvPr id="6" name="内容占位符 5">
-            <a:extLst>
-              <a:ext uri="{FF2B5EF4-FFF2-40B4-BE49-F238E27FC236}">
-                <a16:creationId xmlns:a16="http://schemas.microsoft.com/office/drawing/2014/main" id="{B9AA1024-FF61-AD4A-87F4-5C067193FEE8}"/>
-              </a:ext>
-            </a:extLst>
-          </p:cNvPr>
-          <p:cNvSpPr>
-            <a:spLocks noGrp="1"/>
-          </p:cNvSpPr>
-          <p:nvPr>
-            <p:ph sz="half" idx="1"/>
-          </p:nvPr>
-        </p:nvSpPr>
-        <p:spPr/>
-        <p:txBody>
-          <a:bodyPr/>
-          <a:lstStyle/>
-          <a:p>
-            <a:pPr marL="457200" indent="-457200">
-              <a:buFont typeface="+mj-lt"/>
-              <a:buAutoNum type="arabicPeriod"/>
-            </a:pPr>
-            <a:r>
-              <a:rPr lang="en-US" altLang="zh-CN" dirty="0">
-                <a:latin typeface="Gill Sans MT" panose="020B0502020104020203" pitchFamily="34" charset="0"/>
+            <a:pPr algn="ctr"/>
+            <a:r>
+              <a:rPr lang="zh-CN" altLang="en-US" sz="9600" b="0" dirty="0">
+                <a:solidFill>
+                  <a:srgbClr val="C00000"/>
+                </a:solidFill>
+                <a:latin typeface="Futura Medium" panose="020B0602020204020303" pitchFamily="34" charset="-79"/>
+                <a:cs typeface="Futura Medium" panose="020B0602020204020303" pitchFamily="34" charset="-79"/>
+                <a:sym typeface="Huawei Sans" panose="020C0503030203020204" pitchFamily="34" charset="0"/>
               </a:rPr>
-              <a:t>AI </a:t>
-            </a:r>
-            <a:r>
-              <a:rPr lang="zh-CN" altLang="en-US" dirty="0">
-                <a:latin typeface="Gill Sans MT" panose="020B0502020104020203" pitchFamily="34" charset="0"/>
-              </a:rPr>
-              <a:t>模型本身包含众多算子，如 </a:t>
-            </a:r>
-            <a:r>
-              <a:rPr lang="en-US" altLang="zh-CN" dirty="0">
-                <a:latin typeface="Gill Sans MT" panose="020B0502020104020203" pitchFamily="34" charset="0"/>
-              </a:rPr>
-              <a:t>PyTorch</a:t>
-            </a:r>
-            <a:r>
-              <a:rPr lang="zh-CN" altLang="en-US" dirty="0">
-                <a:latin typeface="Gill Sans MT" panose="020B0502020104020203" pitchFamily="34" charset="0"/>
-              </a:rPr>
-              <a:t>有</a:t>
-            </a:r>
-            <a:r>
-              <a:rPr lang="en-US" altLang="zh-CN" dirty="0">
-                <a:latin typeface="Gill Sans MT" panose="020B0502020104020203" pitchFamily="34" charset="0"/>
-              </a:rPr>
-              <a:t>1200+</a:t>
-            </a:r>
-            <a:r>
-              <a:rPr lang="zh-CN" altLang="en-US" dirty="0">
-                <a:latin typeface="Gill Sans MT" panose="020B0502020104020203" pitchFamily="34" charset="0"/>
-              </a:rPr>
-              <a:t> 算子、</a:t>
-            </a:r>
-            <a:r>
-              <a:rPr lang="en-US" altLang="zh-CN" dirty="0">
-                <a:latin typeface="Gill Sans MT" panose="020B0502020104020203" pitchFamily="34" charset="0"/>
-              </a:rPr>
-              <a:t>Tensorflow </a:t>
-            </a:r>
-            <a:r>
-              <a:rPr lang="zh-CN" altLang="en-US" dirty="0">
-                <a:latin typeface="Gill Sans MT" panose="020B0502020104020203" pitchFamily="34" charset="0"/>
-              </a:rPr>
-              <a:t>接近 </a:t>
-            </a:r>
-            <a:r>
-              <a:rPr lang="en-US" altLang="zh-CN" dirty="0">
-                <a:latin typeface="Gill Sans MT" panose="020B0502020104020203" pitchFamily="34" charset="0"/>
-              </a:rPr>
-              <a:t>2000+ </a:t>
-            </a:r>
-            <a:r>
-              <a:rPr lang="zh-CN" altLang="en-US" dirty="0">
-                <a:latin typeface="Gill Sans MT" panose="020B0502020104020203" pitchFamily="34" charset="0"/>
-              </a:rPr>
-              <a:t>算子，推理引擎需要用有限算子去实现不同框架训练出来 </a:t>
-            </a:r>
-            <a:r>
-              <a:rPr lang="en-US" altLang="zh-CN" dirty="0">
-                <a:latin typeface="Gill Sans MT" panose="020B0502020104020203" pitchFamily="34" charset="0"/>
-              </a:rPr>
-              <a:t>AI </a:t>
-            </a:r>
-            <a:r>
-              <a:rPr lang="zh-CN" altLang="en-US" dirty="0">
-                <a:latin typeface="Gill Sans MT" panose="020B0502020104020203" pitchFamily="34" charset="0"/>
-              </a:rPr>
-              <a:t>模型所需要的算子。</a:t>
-            </a:r>
-            <a:endParaRPr lang="en-US" altLang="zh-CN" dirty="0">
-              <a:latin typeface="Gill Sans MT" panose="020B0502020104020203" pitchFamily="34" charset="0"/>
+              <a:t>挑战与目标</a:t>
+            </a:r>
+            <a:endParaRPr kumimoji="1" lang="zh-CN" altLang="en-US" sz="9600" b="0" dirty="0">
+              <a:solidFill>
+                <a:srgbClr val="C00000"/>
+              </a:solidFill>
+              <a:latin typeface="Futura Medium" panose="020B0602020204020303" pitchFamily="34" charset="-79"/>
+              <a:cs typeface="Futura Medium" panose="020B0602020204020303" pitchFamily="34" charset="-79"/>
             </a:endParaRPr>
-          </a:p>
-          <a:p>
-            <a:pPr marL="457200" indent="-457200">
-              <a:lnSpc>
-                <a:spcPct val="150000"/>
-              </a:lnSpc>
-              <a:buFont typeface="+mj-lt"/>
-              <a:buAutoNum type="arabicPeriod"/>
-            </a:pPr>
-            <a:r>
-              <a:rPr lang="zh-CN" altLang="en-US" dirty="0">
-                <a:latin typeface="Gill Sans MT" panose="020B0502020104020203" pitchFamily="34" charset="0"/>
-              </a:rPr>
-              <a:t>支持 </a:t>
-            </a:r>
-            <a:r>
-              <a:rPr lang="en-US" altLang="zh-CN" dirty="0">
-                <a:latin typeface="Gill Sans MT" panose="020B0502020104020203" pitchFamily="34" charset="0"/>
-              </a:rPr>
-              <a:t>Tensorflow</a:t>
-            </a:r>
-            <a:r>
-              <a:rPr lang="zh-CN" altLang="en-US" dirty="0">
-                <a:latin typeface="Gill Sans MT" panose="020B0502020104020203" pitchFamily="34" charset="0"/>
-              </a:rPr>
-              <a:t>、</a:t>
-            </a:r>
-            <a:r>
-              <a:rPr lang="en-US" altLang="zh-CN" dirty="0">
-                <a:latin typeface="Gill Sans MT" panose="020B0502020104020203" pitchFamily="34" charset="0"/>
-              </a:rPr>
-              <a:t>PyTorch</a:t>
-            </a:r>
-            <a:r>
-              <a:rPr lang="zh-CN" altLang="en-US" dirty="0">
-                <a:latin typeface="Gill Sans MT" panose="020B0502020104020203" pitchFamily="34" charset="0"/>
-              </a:rPr>
-              <a:t>、</a:t>
-            </a:r>
-            <a:r>
-              <a:rPr lang="en-US" altLang="zh-CN" dirty="0">
-                <a:latin typeface="Gill Sans MT" panose="020B0502020104020203" pitchFamily="34" charset="0"/>
-              </a:rPr>
-              <a:t>MindSpore</a:t>
-            </a:r>
-            <a:r>
-              <a:rPr lang="zh-CN" altLang="en-US" dirty="0">
-                <a:latin typeface="Gill Sans MT" panose="020B0502020104020203" pitchFamily="34" charset="0"/>
-              </a:rPr>
-              <a:t>、</a:t>
-            </a:r>
-            <a:r>
-              <a:rPr lang="en-US" altLang="zh-CN" dirty="0">
-                <a:latin typeface="Gill Sans MT" panose="020B0502020104020203" pitchFamily="34" charset="0"/>
-              </a:rPr>
-              <a:t>ONNX </a:t>
-            </a:r>
-            <a:r>
-              <a:rPr lang="zh-CN" altLang="en-US" dirty="0">
-                <a:latin typeface="Gill Sans MT" panose="020B0502020104020203" pitchFamily="34" charset="0"/>
-              </a:rPr>
-              <a:t>等主流模型文件格式。</a:t>
-            </a:r>
-            <a:endParaRPr lang="en-US" altLang="zh-CN" dirty="0">
-              <a:latin typeface="Gill Sans MT" panose="020B0502020104020203" pitchFamily="34" charset="0"/>
-            </a:endParaRPr>
-          </a:p>
-          <a:p>
-            <a:pPr marL="457200" indent="-457200">
-              <a:lnSpc>
-                <a:spcPct val="150000"/>
-              </a:lnSpc>
-              <a:buFont typeface="+mj-lt"/>
-              <a:buAutoNum type="arabicPeriod"/>
-            </a:pPr>
-            <a:r>
-              <a:rPr lang="zh-CN" altLang="en-US" dirty="0">
-                <a:latin typeface="Gill Sans MT" panose="020B0502020104020203" pitchFamily="34" charset="0"/>
-              </a:rPr>
-              <a:t>支持 </a:t>
-            </a:r>
-            <a:r>
-              <a:rPr lang="en-US" altLang="zh-CN" dirty="0">
-                <a:latin typeface="Gill Sans MT" panose="020B0502020104020203" pitchFamily="34" charset="0"/>
-              </a:rPr>
-              <a:t>CNN / RNN / GAN / Transformer </a:t>
-            </a:r>
-            <a:r>
-              <a:rPr lang="zh-CN" altLang="en-US" dirty="0">
-                <a:latin typeface="Gill Sans MT" panose="020B0502020104020203" pitchFamily="34" charset="0"/>
-              </a:rPr>
-              <a:t>等主流网络结构。</a:t>
-            </a:r>
-          </a:p>
-          <a:p>
-            <a:pPr marL="457200" indent="-457200">
-              <a:lnSpc>
-                <a:spcPct val="150000"/>
-              </a:lnSpc>
-              <a:buFont typeface="+mj-lt"/>
-              <a:buAutoNum type="arabicPeriod"/>
-            </a:pPr>
-            <a:r>
-              <a:rPr lang="zh-CN" altLang="en-US" dirty="0">
-                <a:latin typeface="Gill Sans MT" panose="020B0502020104020203" pitchFamily="34" charset="0"/>
-              </a:rPr>
-              <a:t>支持多输入多输出，任意维度输入输出，支持动态输入，支持带控制流的模型。</a:t>
-            </a:r>
-          </a:p>
-          <a:p>
-            <a:pPr marL="457200" indent="-457200">
-              <a:buFont typeface="+mj-lt"/>
-              <a:buAutoNum type="arabicPeriod"/>
-            </a:pPr>
-            <a:endParaRPr lang="zh-CN" altLang="en-US" dirty="0"/>
           </a:p>
         </p:txBody>
       </p:sp>
     </p:spTree>
     <p:extLst>
       <p:ext uri="{BB962C8B-B14F-4D97-AF65-F5344CB8AC3E}">
-        <p14:creationId xmlns:p14="http://schemas.microsoft.com/office/powerpoint/2010/main" val="2081238901"/>
+        <p14:creationId xmlns:p14="http://schemas.microsoft.com/office/powerpoint/2010/main" val="3340961041"/>
       </p:ext>
     </p:extLst>
   </p:cSld>
@@ -41107,10 +41289,10 @@
       </p:grpSpPr>
       <p:sp>
         <p:nvSpPr>
-          <p:cNvPr id="2" name="标题 1">
+          <p:cNvPr id="5" name="标题 4">
             <a:extLst>
               <a:ext uri="{FF2B5EF4-FFF2-40B4-BE49-F238E27FC236}">
-                <a16:creationId xmlns:a16="http://schemas.microsoft.com/office/drawing/2014/main" id="{8A1B07AB-8AC0-2C42-9CD8-3B19C2CD10B1}"/>
+                <a16:creationId xmlns:a16="http://schemas.microsoft.com/office/drawing/2014/main" id="{1EE43E42-0F5F-8144-A3DF-E8EDD0648BA6}"/>
               </a:ext>
             </a:extLst>
           </p:cNvPr>
@@ -41127,46 +41309,187 @@
           <a:lstStyle/>
           <a:p>
             <a:r>
-              <a:rPr lang="zh-CN" altLang="en-US" dirty="0"/>
-              <a:t>开发推理程序</a:t>
-            </a:r>
+              <a:rPr lang="en-US" altLang="zh-CN" dirty="0"/>
+              <a:t>Challenge</a:t>
+            </a:r>
+            <a:endParaRPr lang="zh-CN" altLang="en-US" dirty="0"/>
           </a:p>
         </p:txBody>
       </p:sp>
-      <p:pic>
-        <p:nvPicPr>
-          <p:cNvPr id="3" name="图片 2">
+      <p:sp>
+        <p:nvSpPr>
+          <p:cNvPr id="6" name="内容占位符 5">
             <a:extLst>
               <a:ext uri="{FF2B5EF4-FFF2-40B4-BE49-F238E27FC236}">
-                <a16:creationId xmlns:a16="http://schemas.microsoft.com/office/drawing/2014/main" id="{54791655-4558-A948-9401-7E2ABB0D8881}"/>
+                <a16:creationId xmlns:a16="http://schemas.microsoft.com/office/drawing/2014/main" id="{B9AA1024-FF61-AD4A-87F4-5C067193FEE8}"/>
               </a:ext>
             </a:extLst>
           </p:cNvPr>
-          <p:cNvPicPr>
-            <a:picLocks noChangeAspect="1"/>
-          </p:cNvPicPr>
-          <p:nvPr/>
-        </p:nvPicPr>
-        <p:blipFill>
-          <a:blip r:embed="rId2"/>
-          <a:stretch>
-            <a:fillRect/>
-          </a:stretch>
-        </p:blipFill>
-        <p:spPr>
-          <a:xfrm>
-            <a:off x="3209131" y="1936750"/>
-            <a:ext cx="5778500" cy="2984500"/>
-          </a:xfrm>
-          <a:prstGeom prst="rect">
-            <a:avLst/>
-          </a:prstGeom>
-        </p:spPr>
-      </p:pic>
+          <p:cNvSpPr>
+            <a:spLocks noGrp="1"/>
+          </p:cNvSpPr>
+          <p:nvPr>
+            <p:ph sz="half" idx="1"/>
+          </p:nvPr>
+        </p:nvSpPr>
+        <p:spPr/>
+        <p:txBody>
+          <a:bodyPr/>
+          <a:lstStyle/>
+          <a:p>
+            <a:pPr marL="457200" indent="-457200">
+              <a:buFont typeface="+mj-lt"/>
+              <a:buAutoNum type="arabicPeriod"/>
+            </a:pPr>
+            <a:r>
+              <a:rPr lang="en-US" altLang="zh-CN" dirty="0">
+                <a:latin typeface="Gill Sans MT" panose="020B0502020104020203" pitchFamily="34" charset="0"/>
+              </a:rPr>
+              <a:t>AI </a:t>
+            </a:r>
+            <a:r>
+              <a:rPr lang="zh-CN" altLang="en-US" dirty="0">
+                <a:latin typeface="Gill Sans MT" panose="020B0502020104020203" pitchFamily="34" charset="0"/>
+              </a:rPr>
+              <a:t>模型本身包含众多算子，推理引擎需要用有限算子实现不同框架 </a:t>
+            </a:r>
+            <a:r>
+              <a:rPr lang="en-US" altLang="zh-CN" dirty="0">
+                <a:latin typeface="Gill Sans MT" panose="020B0502020104020203" pitchFamily="34" charset="0"/>
+              </a:rPr>
+              <a:t>AI </a:t>
+            </a:r>
+            <a:r>
+              <a:rPr lang="zh-CN" altLang="en-US" dirty="0">
+                <a:latin typeface="Gill Sans MT" panose="020B0502020104020203" pitchFamily="34" charset="0"/>
+              </a:rPr>
+              <a:t>模型所需要的算子。</a:t>
+            </a:r>
+            <a:endParaRPr lang="en-US" altLang="zh-CN" dirty="0">
+              <a:latin typeface="Gill Sans MT" panose="020B0502020104020203" pitchFamily="34" charset="0"/>
+            </a:endParaRPr>
+          </a:p>
+          <a:p>
+            <a:pPr marL="457200" indent="-457200">
+              <a:lnSpc>
+                <a:spcPct val="150000"/>
+              </a:lnSpc>
+              <a:buFont typeface="+mj-lt"/>
+              <a:buAutoNum type="arabicPeriod"/>
+            </a:pPr>
+            <a:r>
+              <a:rPr lang="zh-CN" altLang="en-US" dirty="0">
+                <a:latin typeface="Gill Sans MT" panose="020B0502020104020203" pitchFamily="34" charset="0"/>
+              </a:rPr>
+              <a:t>支持 </a:t>
+            </a:r>
+            <a:r>
+              <a:rPr lang="en-US" altLang="zh-CN" dirty="0">
+                <a:latin typeface="Gill Sans MT" panose="020B0502020104020203" pitchFamily="34" charset="0"/>
+              </a:rPr>
+              <a:t>Tensorflow</a:t>
+            </a:r>
+            <a:r>
+              <a:rPr lang="zh-CN" altLang="en-US" dirty="0">
+                <a:latin typeface="Gill Sans MT" panose="020B0502020104020203" pitchFamily="34" charset="0"/>
+              </a:rPr>
+              <a:t>、</a:t>
+            </a:r>
+            <a:r>
+              <a:rPr lang="en-US" altLang="zh-CN" dirty="0">
+                <a:latin typeface="Gill Sans MT" panose="020B0502020104020203" pitchFamily="34" charset="0"/>
+              </a:rPr>
+              <a:t>PyTorch</a:t>
+            </a:r>
+            <a:r>
+              <a:rPr lang="zh-CN" altLang="en-US" dirty="0">
+                <a:latin typeface="Gill Sans MT" panose="020B0502020104020203" pitchFamily="34" charset="0"/>
+              </a:rPr>
+              <a:t>、</a:t>
+            </a:r>
+            <a:r>
+              <a:rPr lang="en-US" altLang="zh-CN" dirty="0">
+                <a:latin typeface="Gill Sans MT" panose="020B0502020104020203" pitchFamily="34" charset="0"/>
+              </a:rPr>
+              <a:t>MindSpore</a:t>
+            </a:r>
+            <a:r>
+              <a:rPr lang="zh-CN" altLang="en-US" dirty="0">
+                <a:latin typeface="Gill Sans MT" panose="020B0502020104020203" pitchFamily="34" charset="0"/>
+              </a:rPr>
+              <a:t>、</a:t>
+            </a:r>
+            <a:r>
+              <a:rPr lang="en-US" altLang="zh-CN" dirty="0">
+                <a:latin typeface="Gill Sans MT" panose="020B0502020104020203" pitchFamily="34" charset="0"/>
+              </a:rPr>
+              <a:t>ONNX </a:t>
+            </a:r>
+            <a:r>
+              <a:rPr lang="zh-CN" altLang="en-US" dirty="0">
+                <a:latin typeface="Gill Sans MT" panose="020B0502020104020203" pitchFamily="34" charset="0"/>
+              </a:rPr>
+              <a:t>等主流模型文件格式。</a:t>
+            </a:r>
+            <a:endParaRPr lang="en-US" altLang="zh-CN" dirty="0">
+              <a:latin typeface="Gill Sans MT" panose="020B0502020104020203" pitchFamily="34" charset="0"/>
+            </a:endParaRPr>
+          </a:p>
+          <a:p>
+            <a:pPr marL="457200" indent="-457200">
+              <a:lnSpc>
+                <a:spcPct val="150000"/>
+              </a:lnSpc>
+              <a:buFont typeface="+mj-lt"/>
+              <a:buAutoNum type="arabicPeriod"/>
+            </a:pPr>
+            <a:r>
+              <a:rPr lang="zh-CN" altLang="en-US" dirty="0">
+                <a:latin typeface="Gill Sans MT" panose="020B0502020104020203" pitchFamily="34" charset="0"/>
+              </a:rPr>
+              <a:t>支持 </a:t>
+            </a:r>
+            <a:r>
+              <a:rPr lang="en-US" altLang="zh-CN" dirty="0">
+                <a:latin typeface="Gill Sans MT" panose="020B0502020104020203" pitchFamily="34" charset="0"/>
+              </a:rPr>
+              <a:t>CNN / RNN / GAN / Transformer </a:t>
+            </a:r>
+            <a:r>
+              <a:rPr lang="zh-CN" altLang="en-US" dirty="0">
+                <a:latin typeface="Gill Sans MT" panose="020B0502020104020203" pitchFamily="34" charset="0"/>
+              </a:rPr>
+              <a:t>等主流网络结构。</a:t>
+            </a:r>
+          </a:p>
+          <a:p>
+            <a:pPr marL="457200" indent="-457200">
+              <a:lnSpc>
+                <a:spcPct val="150000"/>
+              </a:lnSpc>
+              <a:buFont typeface="+mj-lt"/>
+              <a:buAutoNum type="arabicPeriod"/>
+            </a:pPr>
+            <a:r>
+              <a:rPr lang="zh-CN" altLang="en-US" dirty="0">
+                <a:latin typeface="Gill Sans MT" panose="020B0502020104020203" pitchFamily="34" charset="0"/>
+              </a:rPr>
+              <a:t>支持多输入多输出，任意维度输入输出，支持动态输入，支持带控制流的模型。</a:t>
+            </a:r>
+          </a:p>
+          <a:p>
+            <a:pPr marL="457200" indent="-457200">
+              <a:buFont typeface="+mj-lt"/>
+              <a:buAutoNum type="arabicPeriod"/>
+            </a:pPr>
+            <a:endParaRPr lang="zh-CN" altLang="en-US" dirty="0"/>
+          </a:p>
+        </p:txBody>
+      </p:sp>
     </p:spTree>
     <p:extLst>
       <p:ext uri="{BB962C8B-B14F-4D97-AF65-F5344CB8AC3E}">
-        <p14:creationId xmlns:p14="http://schemas.microsoft.com/office/powerpoint/2010/main" val="1487473700"/>
+        <p14:creationId xmlns:p14="http://schemas.microsoft.com/office/powerpoint/2010/main" val="2081238901"/>
       </p:ext>
     </p:extLst>
   </p:cSld>
@@ -41221,8 +41544,8 @@
         </p:nvSpPr>
         <p:spPr>
           <a:xfrm>
-            <a:off x="616645" y="404664"/>
-            <a:ext cx="10963473" cy="5400600"/>
+            <a:off x="616645" y="980728"/>
+            <a:ext cx="10963473" cy="4824536"/>
           </a:xfrm>
           <a:prstGeom prst="rect">
             <a:avLst/>
@@ -41388,39 +41711,17 @@
             <a:r>
               <a:rPr lang="zh-CN" altLang="en-US" sz="9600" b="0" dirty="0">
                 <a:solidFill>
-                  <a:srgbClr val="FFC000"/>
+                  <a:srgbClr val="C00000"/>
                 </a:solidFill>
                 <a:latin typeface="Futura Medium" panose="020B0602020204020303" pitchFamily="34" charset="-79"/>
                 <a:cs typeface="Futura Medium" panose="020B0602020204020303" pitchFamily="34" charset="-79"/>
                 <a:sym typeface="Huawei Sans" panose="020C0503030203020204" pitchFamily="34" charset="0"/>
               </a:rPr>
-              <a:t>整体架构</a:t>
-            </a:r>
-            <a:endParaRPr lang="en-US" altLang="zh-CN" sz="9600" b="0" dirty="0">
-              <a:solidFill>
-                <a:srgbClr val="FFC000"/>
-              </a:solidFill>
-              <a:latin typeface="Futura Medium" panose="020B0602020204020303" pitchFamily="34" charset="-79"/>
-              <a:cs typeface="Futura Medium" panose="020B0602020204020303" pitchFamily="34" charset="-79"/>
-              <a:sym typeface="Huawei Sans" panose="020C0503030203020204" pitchFamily="34" charset="0"/>
-            </a:endParaRPr>
-          </a:p>
-          <a:p>
-            <a:pPr algn="ctr"/>
-            <a:r>
-              <a:rPr kumimoji="1" lang="en-US" altLang="zh-CN" sz="9600" b="0" dirty="0">
-                <a:solidFill>
-                  <a:srgbClr val="FFC000"/>
-                </a:solidFill>
-                <a:latin typeface="Futura Medium" panose="020B0602020204020303" pitchFamily="34" charset="-79"/>
-                <a:cs typeface="Futura Medium" panose="020B0602020204020303" pitchFamily="34" charset="-79"/>
-                <a:sym typeface="Huawei Sans" panose="020C0503030203020204" pitchFamily="34" charset="0"/>
-              </a:rPr>
-              <a:t>Architecture</a:t>
+              <a:t>文件格式</a:t>
             </a:r>
             <a:endParaRPr kumimoji="1" lang="zh-CN" altLang="en-US" sz="9600" b="0" dirty="0">
               <a:solidFill>
-                <a:srgbClr val="FFC000"/>
+                <a:srgbClr val="C00000"/>
               </a:solidFill>
               <a:latin typeface="Futura Medium" panose="020B0602020204020303" pitchFamily="34" charset="-79"/>
               <a:cs typeface="Futura Medium" panose="020B0602020204020303" pitchFamily="34" charset="-79"/>
@@ -41431,7 +41732,7 @@
     </p:spTree>
     <p:extLst>
       <p:ext uri="{BB962C8B-B14F-4D97-AF65-F5344CB8AC3E}">
-        <p14:creationId xmlns:p14="http://schemas.microsoft.com/office/powerpoint/2010/main" val="3340961041"/>
+        <p14:creationId xmlns:p14="http://schemas.microsoft.com/office/powerpoint/2010/main" val="1715852970"/>
       </p:ext>
     </p:extLst>
   </p:cSld>
@@ -41472,68 +41773,245 @@
       </p:grpSpPr>
       <p:sp>
         <p:nvSpPr>
-          <p:cNvPr id="17" name="Title 16"/>
+          <p:cNvPr id="11" name="标题 1">
+            <a:extLst>
+              <a:ext uri="{FF2B5EF4-FFF2-40B4-BE49-F238E27FC236}">
+                <a16:creationId xmlns:a16="http://schemas.microsoft.com/office/drawing/2014/main" id="{DAD4934B-A6D5-F641-A028-A1441C365755}"/>
+              </a:ext>
+            </a:extLst>
+          </p:cNvPr>
           <p:cNvSpPr>
             <a:spLocks noGrp="1"/>
           </p:cNvSpPr>
-          <p:nvPr>
-            <p:ph type="title"/>
-          </p:nvPr>
+          <p:nvPr/>
         </p:nvSpPr>
-        <p:spPr/>
+        <p:spPr>
+          <a:xfrm>
+            <a:off x="616645" y="980728"/>
+            <a:ext cx="10963473" cy="4824536"/>
+          </a:xfrm>
+          <a:prstGeom prst="rect">
+            <a:avLst/>
+          </a:prstGeom>
+          <a:noFill/>
+        </p:spPr>
         <p:txBody>
-          <a:bodyPr/>
-          <a:lstStyle/>
+          <a:bodyPr anchor="ctr"/>
+          <a:lstStyle>
+            <a:lvl1pPr algn="l" rtl="0" eaLnBrk="1" fontAlgn="base" hangingPunct="1">
+              <a:spcBef>
+                <a:spcPct val="0"/>
+              </a:spcBef>
+              <a:spcAft>
+                <a:spcPct val="0"/>
+              </a:spcAft>
+              <a:defRPr kumimoji="0" lang="zh-CN" altLang="en-US" sz="3199" b="1" i="0" u="none" strike="noStrike" kern="0" cap="none" spc="0" normalizeH="0" baseline="0" dirty="0">
+                <a:ln>
+                  <a:noFill/>
+                </a:ln>
+                <a:solidFill>
+                  <a:srgbClr val="384056"/>
+                </a:solidFill>
+                <a:effectLst/>
+                <a:uLnTx/>
+                <a:uFillTx/>
+                <a:latin typeface="微软雅黑" pitchFamily="34" charset="-122"/>
+                <a:ea typeface="微软雅黑" pitchFamily="34" charset="-122"/>
+                <a:cs typeface="Arial" pitchFamily="34" charset="0"/>
+              </a:defRPr>
+            </a:lvl1pPr>
+            <a:lvl2pPr algn="l" rtl="0" eaLnBrk="1" fontAlgn="base" hangingPunct="1">
+              <a:spcBef>
+                <a:spcPct val="0"/>
+              </a:spcBef>
+              <a:spcAft>
+                <a:spcPct val="0"/>
+              </a:spcAft>
+              <a:defRPr sz="3199" b="1">
+                <a:solidFill>
+                  <a:srgbClr val="990000"/>
+                </a:solidFill>
+                <a:latin typeface="FrutigerNext LT Medium" pitchFamily="34" charset="0"/>
+                <a:ea typeface="华文细黑" pitchFamily="2" charset="-122"/>
+                <a:cs typeface="SimSun" pitchFamily="2" charset="-122"/>
+              </a:defRPr>
+            </a:lvl2pPr>
+            <a:lvl3pPr algn="l" rtl="0" eaLnBrk="1" fontAlgn="base" hangingPunct="1">
+              <a:spcBef>
+                <a:spcPct val="0"/>
+              </a:spcBef>
+              <a:spcAft>
+                <a:spcPct val="0"/>
+              </a:spcAft>
+              <a:defRPr sz="3199" b="1">
+                <a:solidFill>
+                  <a:srgbClr val="990000"/>
+                </a:solidFill>
+                <a:latin typeface="FrutigerNext LT Medium" pitchFamily="34" charset="0"/>
+                <a:ea typeface="华文细黑" pitchFamily="2" charset="-122"/>
+                <a:cs typeface="SimSun" pitchFamily="2" charset="-122"/>
+              </a:defRPr>
+            </a:lvl3pPr>
+            <a:lvl4pPr algn="l" rtl="0" eaLnBrk="1" fontAlgn="base" hangingPunct="1">
+              <a:spcBef>
+                <a:spcPct val="0"/>
+              </a:spcBef>
+              <a:spcAft>
+                <a:spcPct val="0"/>
+              </a:spcAft>
+              <a:defRPr sz="3199" b="1">
+                <a:solidFill>
+                  <a:srgbClr val="990000"/>
+                </a:solidFill>
+                <a:latin typeface="FrutigerNext LT Medium" pitchFamily="34" charset="0"/>
+                <a:ea typeface="华文细黑" pitchFamily="2" charset="-122"/>
+                <a:cs typeface="SimSun" pitchFamily="2" charset="-122"/>
+              </a:defRPr>
+            </a:lvl4pPr>
+            <a:lvl5pPr algn="l" rtl="0" eaLnBrk="1" fontAlgn="base" hangingPunct="1">
+              <a:spcBef>
+                <a:spcPct val="0"/>
+              </a:spcBef>
+              <a:spcAft>
+                <a:spcPct val="0"/>
+              </a:spcAft>
+              <a:defRPr sz="3199" b="1">
+                <a:solidFill>
+                  <a:srgbClr val="990000"/>
+                </a:solidFill>
+                <a:latin typeface="FrutigerNext LT Medium" pitchFamily="34" charset="0"/>
+                <a:ea typeface="华文细黑" pitchFamily="2" charset="-122"/>
+                <a:cs typeface="SimSun" pitchFamily="2" charset="-122"/>
+              </a:defRPr>
+            </a:lvl5pPr>
+            <a:lvl6pPr marL="456854" algn="l" rtl="0" eaLnBrk="1" fontAlgn="base" hangingPunct="1">
+              <a:spcBef>
+                <a:spcPct val="0"/>
+              </a:spcBef>
+              <a:spcAft>
+                <a:spcPct val="0"/>
+              </a:spcAft>
+              <a:defRPr sz="3199" b="1">
+                <a:solidFill>
+                  <a:srgbClr val="990000"/>
+                </a:solidFill>
+                <a:latin typeface="FrutigerNext LT Medium" pitchFamily="34" charset="0"/>
+                <a:ea typeface="华文细黑" pitchFamily="2" charset="-122"/>
+                <a:cs typeface="SimSun" pitchFamily="2" charset="-122"/>
+              </a:defRPr>
+            </a:lvl6pPr>
+            <a:lvl7pPr marL="913707" algn="l" rtl="0" eaLnBrk="1" fontAlgn="base" hangingPunct="1">
+              <a:spcBef>
+                <a:spcPct val="0"/>
+              </a:spcBef>
+              <a:spcAft>
+                <a:spcPct val="0"/>
+              </a:spcAft>
+              <a:defRPr sz="3199" b="1">
+                <a:solidFill>
+                  <a:srgbClr val="990000"/>
+                </a:solidFill>
+                <a:latin typeface="FrutigerNext LT Medium" pitchFamily="34" charset="0"/>
+                <a:ea typeface="华文细黑" pitchFamily="2" charset="-122"/>
+                <a:cs typeface="SimSun" pitchFamily="2" charset="-122"/>
+              </a:defRPr>
+            </a:lvl7pPr>
+            <a:lvl8pPr marL="1370561" algn="l" rtl="0" eaLnBrk="1" fontAlgn="base" hangingPunct="1">
+              <a:spcBef>
+                <a:spcPct val="0"/>
+              </a:spcBef>
+              <a:spcAft>
+                <a:spcPct val="0"/>
+              </a:spcAft>
+              <a:defRPr sz="3199" b="1">
+                <a:solidFill>
+                  <a:srgbClr val="990000"/>
+                </a:solidFill>
+                <a:latin typeface="FrutigerNext LT Medium" pitchFamily="34" charset="0"/>
+                <a:ea typeface="华文细黑" pitchFamily="2" charset="-122"/>
+                <a:cs typeface="SimSun" pitchFamily="2" charset="-122"/>
+              </a:defRPr>
+            </a:lvl8pPr>
+            <a:lvl9pPr marL="1827414" algn="l" rtl="0" eaLnBrk="1" fontAlgn="base" hangingPunct="1">
+              <a:spcBef>
+                <a:spcPct val="0"/>
+              </a:spcBef>
+              <a:spcAft>
+                <a:spcPct val="0"/>
+              </a:spcAft>
+              <a:defRPr sz="3199" b="1">
+                <a:solidFill>
+                  <a:srgbClr val="990000"/>
+                </a:solidFill>
+                <a:latin typeface="FrutigerNext LT Medium" pitchFamily="34" charset="0"/>
+                <a:ea typeface="华文细黑" pitchFamily="2" charset="-122"/>
+                <a:cs typeface="SimSun" pitchFamily="2" charset="-122"/>
+              </a:defRPr>
+            </a:lvl9pPr>
+          </a:lstStyle>
           <a:p>
-            <a:r>
-              <a:rPr lang="zh-CN" altLang="en-US" dirty="0"/>
-              <a:t>参考文献</a:t>
-            </a:r>
-            <a:endParaRPr lang="en-US" dirty="0"/>
+            <a:pPr algn="ctr"/>
+            <a:r>
+              <a:rPr lang="zh-CN" altLang="en-US" sz="9600" b="0" dirty="0">
+                <a:solidFill>
+                  <a:srgbClr val="C00000"/>
+                </a:solidFill>
+                <a:latin typeface="Futura Medium" panose="020B0602020204020303" pitchFamily="34" charset="-79"/>
+                <a:cs typeface="Futura Medium" panose="020B0602020204020303" pitchFamily="34" charset="-79"/>
+                <a:sym typeface="Huawei Sans" panose="020C0503030203020204" pitchFamily="34" charset="0"/>
+              </a:rPr>
+              <a:t>转换模块</a:t>
+            </a:r>
+            <a:endParaRPr lang="en-US" altLang="zh-CN" sz="9600" b="0" dirty="0">
+              <a:solidFill>
+                <a:srgbClr val="C00000"/>
+              </a:solidFill>
+              <a:latin typeface="Futura Medium" panose="020B0602020204020303" pitchFamily="34" charset="-79"/>
+              <a:cs typeface="Futura Medium" panose="020B0602020204020303" pitchFamily="34" charset="-79"/>
+              <a:sym typeface="Huawei Sans" panose="020C0503030203020204" pitchFamily="34" charset="0"/>
+            </a:endParaRPr>
           </a:p>
-        </p:txBody>
-      </p:sp>
-      <p:sp>
-        <p:nvSpPr>
-          <p:cNvPr id="6" name="Text Placeholder 5"/>
-          <p:cNvSpPr>
-            <a:spLocks noGrp="1"/>
-          </p:cNvSpPr>
-          <p:nvPr>
-            <p:ph sz="half" idx="1"/>
-          </p:nvPr>
-        </p:nvSpPr>
-        <p:spPr/>
-        <p:txBody>
-          <a:bodyPr/>
-          <a:lstStyle/>
           <a:p>
-            <a:pPr marL="404813" indent="-395288">
-              <a:buFont typeface="+mj-lt"/>
-              <a:buAutoNum type="arabicPeriod"/>
-            </a:pPr>
-            <a:endParaRPr lang="en-US" sz="1200" dirty="0"/>
+            <a:pPr algn="ctr"/>
+            <a:r>
+              <a:rPr kumimoji="1" lang="zh-CN" altLang="en-US" sz="9600" b="0" dirty="0">
+                <a:solidFill>
+                  <a:srgbClr val="C00000"/>
+                </a:solidFill>
+                <a:latin typeface="Futura Medium" panose="020B0602020204020303" pitchFamily="34" charset="-79"/>
+                <a:cs typeface="Futura Medium" panose="020B0602020204020303" pitchFamily="34" charset="-79"/>
+                <a:sym typeface="Huawei Sans" panose="020C0503030203020204" pitchFamily="34" charset="0"/>
+              </a:rPr>
+              <a:t>架构与原理</a:t>
+            </a:r>
+            <a:endParaRPr kumimoji="1" lang="zh-CN" altLang="en-US" sz="9600" b="0" dirty="0">
+              <a:solidFill>
+                <a:srgbClr val="C00000"/>
+              </a:solidFill>
+              <a:latin typeface="Futura Medium" panose="020B0602020204020303" pitchFamily="34" charset="-79"/>
+              <a:cs typeface="Futura Medium" panose="020B0602020204020303" pitchFamily="34" charset="-79"/>
+            </a:endParaRPr>
           </a:p>
         </p:txBody>
       </p:sp>
     </p:spTree>
     <p:extLst>
       <p:ext uri="{BB962C8B-B14F-4D97-AF65-F5344CB8AC3E}">
-        <p14:creationId xmlns:p14="http://schemas.microsoft.com/office/powerpoint/2010/main" val="262018297"/>
+        <p14:creationId xmlns:p14="http://schemas.microsoft.com/office/powerpoint/2010/main" val="1695962351"/>
       </p:ext>
     </p:extLst>
   </p:cSld>
   <p:clrMapOvr>
     <a:masterClrMapping/>
   </p:clrMapOvr>
-  <mc:AlternateContent xmlns:mc="http://schemas.openxmlformats.org/markup-compatibility/2006" xmlns:p14="http://schemas.microsoft.com/office/powerpoint/2010/main">
-    <mc:Choice Requires="p14">
-      <p:transition spd="med" p14:dur="700">
-        <p:fade/>
+  <mc:AlternateContent xmlns:mc="http://schemas.openxmlformats.org/markup-compatibility/2006" xmlns:p159="http://schemas.microsoft.com/office/powerpoint/2015/09/main">
+    <mc:Choice Requires="p159">
+      <p:transition spd="slow" advClick="0">
+        <p159:morph option="byObject"/>
       </p:transition>
     </mc:Choice>
     <mc:Fallback xmlns="">
-      <p:transition spd="med">
+      <p:transition spd="slow" advClick="0">
         <p:fade/>
       </p:transition>
     </mc:Fallback>
@@ -41558,10 +42036,211 @@
           <a:chExt cx="0" cy="0"/>
         </a:xfrm>
       </p:grpSpPr>
+      <p:sp>
+        <p:nvSpPr>
+          <p:cNvPr id="11" name="标题 1">
+            <a:extLst>
+              <a:ext uri="{FF2B5EF4-FFF2-40B4-BE49-F238E27FC236}">
+                <a16:creationId xmlns:a16="http://schemas.microsoft.com/office/drawing/2014/main" id="{DAD4934B-A6D5-F641-A028-A1441C365755}"/>
+              </a:ext>
+            </a:extLst>
+          </p:cNvPr>
+          <p:cNvSpPr>
+            <a:spLocks noGrp="1"/>
+          </p:cNvSpPr>
+          <p:nvPr/>
+        </p:nvSpPr>
+        <p:spPr>
+          <a:xfrm>
+            <a:off x="616645" y="980728"/>
+            <a:ext cx="10963473" cy="4824536"/>
+          </a:xfrm>
+          <a:prstGeom prst="rect">
+            <a:avLst/>
+          </a:prstGeom>
+          <a:noFill/>
+        </p:spPr>
+        <p:txBody>
+          <a:bodyPr anchor="ctr"/>
+          <a:lstStyle>
+            <a:lvl1pPr algn="l" rtl="0" eaLnBrk="1" fontAlgn="base" hangingPunct="1">
+              <a:spcBef>
+                <a:spcPct val="0"/>
+              </a:spcBef>
+              <a:spcAft>
+                <a:spcPct val="0"/>
+              </a:spcAft>
+              <a:defRPr kumimoji="0" lang="zh-CN" altLang="en-US" sz="3199" b="1" i="0" u="none" strike="noStrike" kern="0" cap="none" spc="0" normalizeH="0" baseline="0" dirty="0">
+                <a:ln>
+                  <a:noFill/>
+                </a:ln>
+                <a:solidFill>
+                  <a:srgbClr val="384056"/>
+                </a:solidFill>
+                <a:effectLst/>
+                <a:uLnTx/>
+                <a:uFillTx/>
+                <a:latin typeface="微软雅黑" pitchFamily="34" charset="-122"/>
+                <a:ea typeface="微软雅黑" pitchFamily="34" charset="-122"/>
+                <a:cs typeface="Arial" pitchFamily="34" charset="0"/>
+              </a:defRPr>
+            </a:lvl1pPr>
+            <a:lvl2pPr algn="l" rtl="0" eaLnBrk="1" fontAlgn="base" hangingPunct="1">
+              <a:spcBef>
+                <a:spcPct val="0"/>
+              </a:spcBef>
+              <a:spcAft>
+                <a:spcPct val="0"/>
+              </a:spcAft>
+              <a:defRPr sz="3199" b="1">
+                <a:solidFill>
+                  <a:srgbClr val="990000"/>
+                </a:solidFill>
+                <a:latin typeface="FrutigerNext LT Medium" pitchFamily="34" charset="0"/>
+                <a:ea typeface="华文细黑" pitchFamily="2" charset="-122"/>
+                <a:cs typeface="SimSun" pitchFamily="2" charset="-122"/>
+              </a:defRPr>
+            </a:lvl2pPr>
+            <a:lvl3pPr algn="l" rtl="0" eaLnBrk="1" fontAlgn="base" hangingPunct="1">
+              <a:spcBef>
+                <a:spcPct val="0"/>
+              </a:spcBef>
+              <a:spcAft>
+                <a:spcPct val="0"/>
+              </a:spcAft>
+              <a:defRPr sz="3199" b="1">
+                <a:solidFill>
+                  <a:srgbClr val="990000"/>
+                </a:solidFill>
+                <a:latin typeface="FrutigerNext LT Medium" pitchFamily="34" charset="0"/>
+                <a:ea typeface="华文细黑" pitchFamily="2" charset="-122"/>
+                <a:cs typeface="SimSun" pitchFamily="2" charset="-122"/>
+              </a:defRPr>
+            </a:lvl3pPr>
+            <a:lvl4pPr algn="l" rtl="0" eaLnBrk="1" fontAlgn="base" hangingPunct="1">
+              <a:spcBef>
+                <a:spcPct val="0"/>
+              </a:spcBef>
+              <a:spcAft>
+                <a:spcPct val="0"/>
+              </a:spcAft>
+              <a:defRPr sz="3199" b="1">
+                <a:solidFill>
+                  <a:srgbClr val="990000"/>
+                </a:solidFill>
+                <a:latin typeface="FrutigerNext LT Medium" pitchFamily="34" charset="0"/>
+                <a:ea typeface="华文细黑" pitchFamily="2" charset="-122"/>
+                <a:cs typeface="SimSun" pitchFamily="2" charset="-122"/>
+              </a:defRPr>
+            </a:lvl4pPr>
+            <a:lvl5pPr algn="l" rtl="0" eaLnBrk="1" fontAlgn="base" hangingPunct="1">
+              <a:spcBef>
+                <a:spcPct val="0"/>
+              </a:spcBef>
+              <a:spcAft>
+                <a:spcPct val="0"/>
+              </a:spcAft>
+              <a:defRPr sz="3199" b="1">
+                <a:solidFill>
+                  <a:srgbClr val="990000"/>
+                </a:solidFill>
+                <a:latin typeface="FrutigerNext LT Medium" pitchFamily="34" charset="0"/>
+                <a:ea typeface="华文细黑" pitchFamily="2" charset="-122"/>
+                <a:cs typeface="SimSun" pitchFamily="2" charset="-122"/>
+              </a:defRPr>
+            </a:lvl5pPr>
+            <a:lvl6pPr marL="456854" algn="l" rtl="0" eaLnBrk="1" fontAlgn="base" hangingPunct="1">
+              <a:spcBef>
+                <a:spcPct val="0"/>
+              </a:spcBef>
+              <a:spcAft>
+                <a:spcPct val="0"/>
+              </a:spcAft>
+              <a:defRPr sz="3199" b="1">
+                <a:solidFill>
+                  <a:srgbClr val="990000"/>
+                </a:solidFill>
+                <a:latin typeface="FrutigerNext LT Medium" pitchFamily="34" charset="0"/>
+                <a:ea typeface="华文细黑" pitchFamily="2" charset="-122"/>
+                <a:cs typeface="SimSun" pitchFamily="2" charset="-122"/>
+              </a:defRPr>
+            </a:lvl6pPr>
+            <a:lvl7pPr marL="913707" algn="l" rtl="0" eaLnBrk="1" fontAlgn="base" hangingPunct="1">
+              <a:spcBef>
+                <a:spcPct val="0"/>
+              </a:spcBef>
+              <a:spcAft>
+                <a:spcPct val="0"/>
+              </a:spcAft>
+              <a:defRPr sz="3199" b="1">
+                <a:solidFill>
+                  <a:srgbClr val="990000"/>
+                </a:solidFill>
+                <a:latin typeface="FrutigerNext LT Medium" pitchFamily="34" charset="0"/>
+                <a:ea typeface="华文细黑" pitchFamily="2" charset="-122"/>
+                <a:cs typeface="SimSun" pitchFamily="2" charset="-122"/>
+              </a:defRPr>
+            </a:lvl7pPr>
+            <a:lvl8pPr marL="1370561" algn="l" rtl="0" eaLnBrk="1" fontAlgn="base" hangingPunct="1">
+              <a:spcBef>
+                <a:spcPct val="0"/>
+              </a:spcBef>
+              <a:spcAft>
+                <a:spcPct val="0"/>
+              </a:spcAft>
+              <a:defRPr sz="3199" b="1">
+                <a:solidFill>
+                  <a:srgbClr val="990000"/>
+                </a:solidFill>
+                <a:latin typeface="FrutigerNext LT Medium" pitchFamily="34" charset="0"/>
+                <a:ea typeface="华文细黑" pitchFamily="2" charset="-122"/>
+                <a:cs typeface="SimSun" pitchFamily="2" charset="-122"/>
+              </a:defRPr>
+            </a:lvl8pPr>
+            <a:lvl9pPr marL="1827414" algn="l" rtl="0" eaLnBrk="1" fontAlgn="base" hangingPunct="1">
+              <a:spcBef>
+                <a:spcPct val="0"/>
+              </a:spcBef>
+              <a:spcAft>
+                <a:spcPct val="0"/>
+              </a:spcAft>
+              <a:defRPr sz="3199" b="1">
+                <a:solidFill>
+                  <a:srgbClr val="990000"/>
+                </a:solidFill>
+                <a:latin typeface="FrutigerNext LT Medium" pitchFamily="34" charset="0"/>
+                <a:ea typeface="华文细黑" pitchFamily="2" charset="-122"/>
+                <a:cs typeface="SimSun" pitchFamily="2" charset="-122"/>
+              </a:defRPr>
+            </a:lvl9pPr>
+          </a:lstStyle>
+          <a:p>
+            <a:pPr algn="ctr"/>
+            <a:r>
+              <a:rPr lang="en-US" altLang="zh-CN" sz="9600" b="0" dirty="0">
+                <a:solidFill>
+                  <a:srgbClr val="C00000"/>
+                </a:solidFill>
+                <a:latin typeface="Futura Medium" panose="020B0602020204020303" pitchFamily="34" charset="-79"/>
+                <a:cs typeface="Futura Medium" panose="020B0602020204020303" pitchFamily="34" charset="-79"/>
+                <a:sym typeface="Huawei Sans" panose="020C0503030203020204" pitchFamily="34" charset="0"/>
+              </a:rPr>
+              <a:t>ONNX</a:t>
+            </a:r>
+            <a:endParaRPr kumimoji="1" lang="zh-CN" altLang="en-US" sz="9600" b="0" dirty="0">
+              <a:solidFill>
+                <a:srgbClr val="C00000"/>
+              </a:solidFill>
+              <a:latin typeface="Futura Medium" panose="020B0602020204020303" pitchFamily="34" charset="-79"/>
+              <a:cs typeface="Futura Medium" panose="020B0602020204020303" pitchFamily="34" charset="-79"/>
+            </a:endParaRPr>
+          </a:p>
+        </p:txBody>
+      </p:sp>
     </p:spTree>
     <p:extLst>
       <p:ext uri="{BB962C8B-B14F-4D97-AF65-F5344CB8AC3E}">
-        <p14:creationId xmlns:p14="http://schemas.microsoft.com/office/powerpoint/2010/main" val="2327015185"/>
+        <p14:creationId xmlns:p14="http://schemas.microsoft.com/office/powerpoint/2010/main" val="2713730525"/>
       </p:ext>
     </p:extLst>
   </p:cSld>

</xml_diff>